<commit_message>
Added Lecture 2 slides and updated them slightly.
</commit_message>
<xml_diff>
--- a/lecture/slides/ECE_383_Lec2.pptx
+++ b/lecture/slides/ECE_383_Lec2.pptx
@@ -11416,7 +11416,15 @@
             </a:pPr>
             <a:r>
               <a:rPr lang="en-US" sz="1400" dirty="0"/>
-              <a:t>		o	=&gt;	s1);</a:t>
+              <a:t>		</a:t>
+            </a:r>
+            <a:r>
+              <a:rPr lang="en-US" sz="1400" dirty="0" smtClean="0"/>
+              <a:t>o =&gt; s1</a:t>
+            </a:r>
+            <a:r>
+              <a:rPr lang="en-US" sz="1400" dirty="0"/>
+              <a:t>);</a:t>
             </a:r>
           </a:p>
           <a:p>
@@ -11471,7 +11479,15 @@
             </a:pPr>
             <a:r>
               <a:rPr lang="en-US" sz="1400" dirty="0"/>
-              <a:t>		o	=&gt;	s2);</a:t>
+              <a:t>		</a:t>
+            </a:r>
+            <a:r>
+              <a:rPr lang="en-US" sz="1400" dirty="0" smtClean="0"/>
+              <a:t>o =&gt; s2</a:t>
+            </a:r>
+            <a:r>
+              <a:rPr lang="en-US" sz="1400" dirty="0"/>
+              <a:t>);</a:t>
             </a:r>
           </a:p>
           <a:p>
@@ -11526,7 +11542,15 @@
             </a:pPr>
             <a:r>
               <a:rPr lang="en-US" sz="1400" dirty="0"/>
-              <a:t>		o	=&gt;	s3);</a:t>
+              <a:t>		</a:t>
+            </a:r>
+            <a:r>
+              <a:rPr lang="en-US" sz="1400" dirty="0" smtClean="0"/>
+              <a:t>o =&gt; s3</a:t>
+            </a:r>
+            <a:r>
+              <a:rPr lang="en-US" sz="1400" dirty="0"/>
+              <a:t>);</a:t>
             </a:r>
           </a:p>
           <a:p>
@@ -11581,7 +11605,15 @@
             </a:pPr>
             <a:r>
               <a:rPr lang="en-US" sz="1400" dirty="0"/>
-              <a:t>		i2	=&gt;	s3,</a:t>
+              <a:t>		</a:t>
+            </a:r>
+            <a:r>
+              <a:rPr lang="en-US" sz="1400" dirty="0" smtClean="0"/>
+              <a:t>i2 =&gt; s3</a:t>
+            </a:r>
+            <a:r>
+              <a:rPr lang="en-US" sz="1400" dirty="0"/>
+              <a:t>,</a:t>
             </a:r>
           </a:p>
           <a:p>
@@ -14425,6 +14457,47 @@
           </a:p>
         </p:txBody>
       </p:sp>
+      <p:pic>
+        <p:nvPicPr>
+          <p:cNvPr id="1026" name="Picture 2" descr="http://ece.ninja/383/lecture/img/lecture02-1.gif"/>
+          <p:cNvPicPr>
+            <a:picLocks noChangeAspect="1" noChangeArrowheads="1"/>
+          </p:cNvPicPr>
+          <p:nvPr/>
+        </p:nvPicPr>
+        <p:blipFill>
+          <a:blip r:embed="rId2">
+            <a:extLst>
+              <a:ext uri="{28A0092B-C50C-407E-A947-70E740481C1C}">
+                <a14:useLocalDpi xmlns:a14="http://schemas.microsoft.com/office/drawing/2010/main" val="0"/>
+              </a:ext>
+            </a:extLst>
+          </a:blip>
+          <a:srcRect/>
+          <a:stretch>
+            <a:fillRect/>
+          </a:stretch>
+        </p:blipFill>
+        <p:spPr bwMode="auto">
+          <a:xfrm>
+            <a:off x="3936810" y="2739147"/>
+            <a:ext cx="4838700" cy="3371851"/>
+          </a:xfrm>
+          <a:prstGeom prst="rect">
+            <a:avLst/>
+          </a:prstGeom>
+          <a:noFill/>
+          <a:extLst>
+            <a:ext uri="{909E8E84-426E-40DD-AFC4-6F175D3DCCD1}">
+              <a14:hiddenFill xmlns:a14="http://schemas.microsoft.com/office/drawing/2010/main">
+                <a:solidFill>
+                  <a:srgbClr val="FFFFFF"/>
+                </a:solidFill>
+              </a14:hiddenFill>
+            </a:ext>
+          </a:extLst>
+        </p:spPr>
+      </p:pic>
     </p:spTree>
     <p:extLst>
       <p:ext uri="{BB962C8B-B14F-4D97-AF65-F5344CB8AC3E}">

</xml_diff>